<commit_message>
Added how to restart the mysql server
</commit_message>
<xml_diff>
--- a/Creating error Log_MySQL.pptx
+++ b/Creating error Log_MySQL.pptx
@@ -11,6 +11,7 @@
     <p:sldId id="258" r:id="rId5"/>
     <p:sldId id="259" r:id="rId6"/>
     <p:sldId id="261" r:id="rId7"/>
+    <p:sldId id="262" r:id="rId8"/>
   </p:sldIdLst>
   <p:sldSz cx="12192000" cy="6858000"/>
   <p:notesSz cx="6858000" cy="9144000"/>
@@ -111,7 +112,7 @@
   </p:defaultTextStyle>
   <p:extLst>
     <p:ext uri="{EFAFB233-063F-42B5-8137-9DF3F51BA10A}">
-      <p15:sldGuideLst xmlns:p15="http://schemas.microsoft.com/office/powerpoint/2012/main"/>
+      <p15:sldGuideLst xmlns:p15="http://schemas.microsoft.com/office/powerpoint/2012/main" xmlns=""/>
     </p:ext>
   </p:extLst>
 </p:presentation>
@@ -143,7 +144,7 @@
           <p:cNvPr id="2" name="Title 1">
             <a:extLst>
               <a:ext uri="{FF2B5EF4-FFF2-40B4-BE49-F238E27FC236}">
-                <a16:creationId xmlns:a16="http://schemas.microsoft.com/office/drawing/2014/main" id="{F98CC463-536B-4433-A6FC-67D26A25D4CD}"/>
+                <a16:creationId xmlns:a16="http://schemas.microsoft.com/office/drawing/2014/main" xmlns="" id="{F98CC463-536B-4433-A6FC-67D26A25D4CD}"/>
               </a:ext>
             </a:extLst>
           </p:cNvPr>
@@ -181,7 +182,7 @@
           <p:cNvPr id="3" name="Subtitle 2">
             <a:extLst>
               <a:ext uri="{FF2B5EF4-FFF2-40B4-BE49-F238E27FC236}">
-                <a16:creationId xmlns:a16="http://schemas.microsoft.com/office/drawing/2014/main" id="{EE9C572E-6D53-4089-BF78-BC5777E2EF3E}"/>
+                <a16:creationId xmlns:a16="http://schemas.microsoft.com/office/drawing/2014/main" xmlns="" id="{EE9C572E-6D53-4089-BF78-BC5777E2EF3E}"/>
               </a:ext>
             </a:extLst>
           </p:cNvPr>
@@ -252,7 +253,7 @@
           <p:cNvPr id="4" name="Date Placeholder 3">
             <a:extLst>
               <a:ext uri="{FF2B5EF4-FFF2-40B4-BE49-F238E27FC236}">
-                <a16:creationId xmlns:a16="http://schemas.microsoft.com/office/drawing/2014/main" id="{CBBFFC52-1920-4015-B79D-A6E6AEE63BE6}"/>
+                <a16:creationId xmlns:a16="http://schemas.microsoft.com/office/drawing/2014/main" xmlns="" id="{CBBFFC52-1920-4015-B79D-A6E6AEE63BE6}"/>
               </a:ext>
             </a:extLst>
           </p:cNvPr>
@@ -270,7 +271,8 @@
           <a:p>
             <a:fld id="{F6036212-B8CF-409C-B496-D16CDAE2BAE2}" type="datetimeFigureOut">
               <a:rPr lang="en-IN" smtClean="0"/>
-              <a:t>03-07-2018</a:t>
+              <a:pPr/>
+              <a:t>04-04-2019</a:t>
             </a:fld>
             <a:endParaRPr lang="en-IN"/>
           </a:p>
@@ -281,7 +283,7 @@
           <p:cNvPr id="5" name="Footer Placeholder 4">
             <a:extLst>
               <a:ext uri="{FF2B5EF4-FFF2-40B4-BE49-F238E27FC236}">
-                <a16:creationId xmlns:a16="http://schemas.microsoft.com/office/drawing/2014/main" id="{86F890DB-8107-4DC2-A63B-CAED6A39C974}"/>
+                <a16:creationId xmlns:a16="http://schemas.microsoft.com/office/drawing/2014/main" xmlns="" id="{86F890DB-8107-4DC2-A63B-CAED6A39C974}"/>
               </a:ext>
             </a:extLst>
           </p:cNvPr>
@@ -306,7 +308,7 @@
           <p:cNvPr id="6" name="Slide Number Placeholder 5">
             <a:extLst>
               <a:ext uri="{FF2B5EF4-FFF2-40B4-BE49-F238E27FC236}">
-                <a16:creationId xmlns:a16="http://schemas.microsoft.com/office/drawing/2014/main" id="{2610C867-C130-4D59-8729-762BE594734E}"/>
+                <a16:creationId xmlns:a16="http://schemas.microsoft.com/office/drawing/2014/main" xmlns="" id="{2610C867-C130-4D59-8729-762BE594734E}"/>
               </a:ext>
             </a:extLst>
           </p:cNvPr>
@@ -324,6 +326,7 @@
           <a:p>
             <a:fld id="{A348748B-0C38-4EC9-B201-E2410E4C4195}" type="slidenum">
               <a:rPr lang="en-IN" smtClean="0"/>
+              <a:pPr/>
               <a:t>‹#›</a:t>
             </a:fld>
             <a:endParaRPr lang="en-IN"/>
@@ -333,7 +336,7 @@
     </p:spTree>
     <p:extLst>
       <p:ext uri="{BB962C8B-B14F-4D97-AF65-F5344CB8AC3E}">
-        <p14:creationId xmlns:p14="http://schemas.microsoft.com/office/powerpoint/2010/main" val="4009997473"/>
+        <p14:creationId xmlns:p14="http://schemas.microsoft.com/office/powerpoint/2010/main" xmlns="" val="4009997473"/>
       </p:ext>
     </p:extLst>
   </p:cSld>
@@ -365,7 +368,7 @@
           <p:cNvPr id="2" name="Title 1">
             <a:extLst>
               <a:ext uri="{FF2B5EF4-FFF2-40B4-BE49-F238E27FC236}">
-                <a16:creationId xmlns:a16="http://schemas.microsoft.com/office/drawing/2014/main" id="{8F4809DA-895B-4773-9661-C576AE1971D9}"/>
+                <a16:creationId xmlns:a16="http://schemas.microsoft.com/office/drawing/2014/main" xmlns="" id="{8F4809DA-895B-4773-9661-C576AE1971D9}"/>
               </a:ext>
             </a:extLst>
           </p:cNvPr>
@@ -394,7 +397,7 @@
           <p:cNvPr id="3" name="Vertical Text Placeholder 2">
             <a:extLst>
               <a:ext uri="{FF2B5EF4-FFF2-40B4-BE49-F238E27FC236}">
-                <a16:creationId xmlns:a16="http://schemas.microsoft.com/office/drawing/2014/main" id="{CBE768BC-BC66-4E64-8D2F-247B8E9DE09E}"/>
+                <a16:creationId xmlns:a16="http://schemas.microsoft.com/office/drawing/2014/main" xmlns="" id="{CBE768BC-BC66-4E64-8D2F-247B8E9DE09E}"/>
               </a:ext>
             </a:extLst>
           </p:cNvPr>
@@ -452,7 +455,7 @@
           <p:cNvPr id="4" name="Date Placeholder 3">
             <a:extLst>
               <a:ext uri="{FF2B5EF4-FFF2-40B4-BE49-F238E27FC236}">
-                <a16:creationId xmlns:a16="http://schemas.microsoft.com/office/drawing/2014/main" id="{C46B79A1-24C8-4157-A182-76DDAE41FE42}"/>
+                <a16:creationId xmlns:a16="http://schemas.microsoft.com/office/drawing/2014/main" xmlns="" id="{C46B79A1-24C8-4157-A182-76DDAE41FE42}"/>
               </a:ext>
             </a:extLst>
           </p:cNvPr>
@@ -470,7 +473,8 @@
           <a:p>
             <a:fld id="{F6036212-B8CF-409C-B496-D16CDAE2BAE2}" type="datetimeFigureOut">
               <a:rPr lang="en-IN" smtClean="0"/>
-              <a:t>03-07-2018</a:t>
+              <a:pPr/>
+              <a:t>04-04-2019</a:t>
             </a:fld>
             <a:endParaRPr lang="en-IN"/>
           </a:p>
@@ -481,7 +485,7 @@
           <p:cNvPr id="5" name="Footer Placeholder 4">
             <a:extLst>
               <a:ext uri="{FF2B5EF4-FFF2-40B4-BE49-F238E27FC236}">
-                <a16:creationId xmlns:a16="http://schemas.microsoft.com/office/drawing/2014/main" id="{33CC71DA-3330-4B92-9227-006110243E6A}"/>
+                <a16:creationId xmlns:a16="http://schemas.microsoft.com/office/drawing/2014/main" xmlns="" id="{33CC71DA-3330-4B92-9227-006110243E6A}"/>
               </a:ext>
             </a:extLst>
           </p:cNvPr>
@@ -506,7 +510,7 @@
           <p:cNvPr id="6" name="Slide Number Placeholder 5">
             <a:extLst>
               <a:ext uri="{FF2B5EF4-FFF2-40B4-BE49-F238E27FC236}">
-                <a16:creationId xmlns:a16="http://schemas.microsoft.com/office/drawing/2014/main" id="{DF852FB3-117A-4473-8A84-8FA78EFACA16}"/>
+                <a16:creationId xmlns:a16="http://schemas.microsoft.com/office/drawing/2014/main" xmlns="" id="{DF852FB3-117A-4473-8A84-8FA78EFACA16}"/>
               </a:ext>
             </a:extLst>
           </p:cNvPr>
@@ -524,6 +528,7 @@
           <a:p>
             <a:fld id="{A348748B-0C38-4EC9-B201-E2410E4C4195}" type="slidenum">
               <a:rPr lang="en-IN" smtClean="0"/>
+              <a:pPr/>
               <a:t>‹#›</a:t>
             </a:fld>
             <a:endParaRPr lang="en-IN"/>
@@ -533,7 +538,7 @@
     </p:spTree>
     <p:extLst>
       <p:ext uri="{BB962C8B-B14F-4D97-AF65-F5344CB8AC3E}">
-        <p14:creationId xmlns:p14="http://schemas.microsoft.com/office/powerpoint/2010/main" val="2929164952"/>
+        <p14:creationId xmlns:p14="http://schemas.microsoft.com/office/powerpoint/2010/main" xmlns="" val="2929164952"/>
       </p:ext>
     </p:extLst>
   </p:cSld>
@@ -565,7 +570,7 @@
           <p:cNvPr id="2" name="Vertical Title 1">
             <a:extLst>
               <a:ext uri="{FF2B5EF4-FFF2-40B4-BE49-F238E27FC236}">
-                <a16:creationId xmlns:a16="http://schemas.microsoft.com/office/drawing/2014/main" id="{47A0DCFA-1C6A-4F1C-A9CA-69E974478C4A}"/>
+                <a16:creationId xmlns:a16="http://schemas.microsoft.com/office/drawing/2014/main" xmlns="" id="{47A0DCFA-1C6A-4F1C-A9CA-69E974478C4A}"/>
               </a:ext>
             </a:extLst>
           </p:cNvPr>
@@ -599,7 +604,7 @@
           <p:cNvPr id="3" name="Vertical Text Placeholder 2">
             <a:extLst>
               <a:ext uri="{FF2B5EF4-FFF2-40B4-BE49-F238E27FC236}">
-                <a16:creationId xmlns:a16="http://schemas.microsoft.com/office/drawing/2014/main" id="{7D0C30B6-8134-42F7-9BB5-136204BDC246}"/>
+                <a16:creationId xmlns:a16="http://schemas.microsoft.com/office/drawing/2014/main" xmlns="" id="{7D0C30B6-8134-42F7-9BB5-136204BDC246}"/>
               </a:ext>
             </a:extLst>
           </p:cNvPr>
@@ -662,7 +667,7 @@
           <p:cNvPr id="4" name="Date Placeholder 3">
             <a:extLst>
               <a:ext uri="{FF2B5EF4-FFF2-40B4-BE49-F238E27FC236}">
-                <a16:creationId xmlns:a16="http://schemas.microsoft.com/office/drawing/2014/main" id="{BAE0FCB1-A606-4C3D-89D2-FFC65557AA97}"/>
+                <a16:creationId xmlns:a16="http://schemas.microsoft.com/office/drawing/2014/main" xmlns="" id="{BAE0FCB1-A606-4C3D-89D2-FFC65557AA97}"/>
               </a:ext>
             </a:extLst>
           </p:cNvPr>
@@ -680,7 +685,8 @@
           <a:p>
             <a:fld id="{F6036212-B8CF-409C-B496-D16CDAE2BAE2}" type="datetimeFigureOut">
               <a:rPr lang="en-IN" smtClean="0"/>
-              <a:t>03-07-2018</a:t>
+              <a:pPr/>
+              <a:t>04-04-2019</a:t>
             </a:fld>
             <a:endParaRPr lang="en-IN"/>
           </a:p>
@@ -691,7 +697,7 @@
           <p:cNvPr id="5" name="Footer Placeholder 4">
             <a:extLst>
               <a:ext uri="{FF2B5EF4-FFF2-40B4-BE49-F238E27FC236}">
-                <a16:creationId xmlns:a16="http://schemas.microsoft.com/office/drawing/2014/main" id="{41C577DA-126C-4C08-90FA-E4882DEAE02B}"/>
+                <a16:creationId xmlns:a16="http://schemas.microsoft.com/office/drawing/2014/main" xmlns="" id="{41C577DA-126C-4C08-90FA-E4882DEAE02B}"/>
               </a:ext>
             </a:extLst>
           </p:cNvPr>
@@ -716,7 +722,7 @@
           <p:cNvPr id="6" name="Slide Number Placeholder 5">
             <a:extLst>
               <a:ext uri="{FF2B5EF4-FFF2-40B4-BE49-F238E27FC236}">
-                <a16:creationId xmlns:a16="http://schemas.microsoft.com/office/drawing/2014/main" id="{B35D9BEB-228C-4752-9D83-37B70B96A384}"/>
+                <a16:creationId xmlns:a16="http://schemas.microsoft.com/office/drawing/2014/main" xmlns="" id="{B35D9BEB-228C-4752-9D83-37B70B96A384}"/>
               </a:ext>
             </a:extLst>
           </p:cNvPr>
@@ -734,6 +740,7 @@
           <a:p>
             <a:fld id="{A348748B-0C38-4EC9-B201-E2410E4C4195}" type="slidenum">
               <a:rPr lang="en-IN" smtClean="0"/>
+              <a:pPr/>
               <a:t>‹#›</a:t>
             </a:fld>
             <a:endParaRPr lang="en-IN"/>
@@ -743,7 +750,7 @@
     </p:spTree>
     <p:extLst>
       <p:ext uri="{BB962C8B-B14F-4D97-AF65-F5344CB8AC3E}">
-        <p14:creationId xmlns:p14="http://schemas.microsoft.com/office/powerpoint/2010/main" val="3115957132"/>
+        <p14:creationId xmlns:p14="http://schemas.microsoft.com/office/powerpoint/2010/main" xmlns="" val="3115957132"/>
       </p:ext>
     </p:extLst>
   </p:cSld>
@@ -775,7 +782,7 @@
           <p:cNvPr id="2" name="Title 1">
             <a:extLst>
               <a:ext uri="{FF2B5EF4-FFF2-40B4-BE49-F238E27FC236}">
-                <a16:creationId xmlns:a16="http://schemas.microsoft.com/office/drawing/2014/main" id="{8CBAC85E-4D28-47F1-B772-7E7B902843CB}"/>
+                <a16:creationId xmlns:a16="http://schemas.microsoft.com/office/drawing/2014/main" xmlns="" id="{8CBAC85E-4D28-47F1-B772-7E7B902843CB}"/>
               </a:ext>
             </a:extLst>
           </p:cNvPr>
@@ -804,7 +811,7 @@
           <p:cNvPr id="3" name="Content Placeholder 2">
             <a:extLst>
               <a:ext uri="{FF2B5EF4-FFF2-40B4-BE49-F238E27FC236}">
-                <a16:creationId xmlns:a16="http://schemas.microsoft.com/office/drawing/2014/main" id="{0D1DC770-A4AC-44F9-A2F8-91E5995CD942}"/>
+                <a16:creationId xmlns:a16="http://schemas.microsoft.com/office/drawing/2014/main" xmlns="" id="{0D1DC770-A4AC-44F9-A2F8-91E5995CD942}"/>
               </a:ext>
             </a:extLst>
           </p:cNvPr>
@@ -862,7 +869,7 @@
           <p:cNvPr id="4" name="Date Placeholder 3">
             <a:extLst>
               <a:ext uri="{FF2B5EF4-FFF2-40B4-BE49-F238E27FC236}">
-                <a16:creationId xmlns:a16="http://schemas.microsoft.com/office/drawing/2014/main" id="{96E689C3-7A09-407B-934C-583139005E16}"/>
+                <a16:creationId xmlns:a16="http://schemas.microsoft.com/office/drawing/2014/main" xmlns="" id="{96E689C3-7A09-407B-934C-583139005E16}"/>
               </a:ext>
             </a:extLst>
           </p:cNvPr>
@@ -880,7 +887,8 @@
           <a:p>
             <a:fld id="{F6036212-B8CF-409C-B496-D16CDAE2BAE2}" type="datetimeFigureOut">
               <a:rPr lang="en-IN" smtClean="0"/>
-              <a:t>03-07-2018</a:t>
+              <a:pPr/>
+              <a:t>04-04-2019</a:t>
             </a:fld>
             <a:endParaRPr lang="en-IN"/>
           </a:p>
@@ -891,7 +899,7 @@
           <p:cNvPr id="5" name="Footer Placeholder 4">
             <a:extLst>
               <a:ext uri="{FF2B5EF4-FFF2-40B4-BE49-F238E27FC236}">
-                <a16:creationId xmlns:a16="http://schemas.microsoft.com/office/drawing/2014/main" id="{C3781847-3907-4AD0-9DDE-22003622B1D8}"/>
+                <a16:creationId xmlns:a16="http://schemas.microsoft.com/office/drawing/2014/main" xmlns="" id="{C3781847-3907-4AD0-9DDE-22003622B1D8}"/>
               </a:ext>
             </a:extLst>
           </p:cNvPr>
@@ -916,7 +924,7 @@
           <p:cNvPr id="6" name="Slide Number Placeholder 5">
             <a:extLst>
               <a:ext uri="{FF2B5EF4-FFF2-40B4-BE49-F238E27FC236}">
-                <a16:creationId xmlns:a16="http://schemas.microsoft.com/office/drawing/2014/main" id="{3BEEB320-70CE-4B88-AA3D-2D5203BE14D6}"/>
+                <a16:creationId xmlns:a16="http://schemas.microsoft.com/office/drawing/2014/main" xmlns="" id="{3BEEB320-70CE-4B88-AA3D-2D5203BE14D6}"/>
               </a:ext>
             </a:extLst>
           </p:cNvPr>
@@ -934,6 +942,7 @@
           <a:p>
             <a:fld id="{A348748B-0C38-4EC9-B201-E2410E4C4195}" type="slidenum">
               <a:rPr lang="en-IN" smtClean="0"/>
+              <a:pPr/>
               <a:t>‹#›</a:t>
             </a:fld>
             <a:endParaRPr lang="en-IN"/>
@@ -943,7 +952,7 @@
     </p:spTree>
     <p:extLst>
       <p:ext uri="{BB962C8B-B14F-4D97-AF65-F5344CB8AC3E}">
-        <p14:creationId xmlns:p14="http://schemas.microsoft.com/office/powerpoint/2010/main" val="3499803322"/>
+        <p14:creationId xmlns:p14="http://schemas.microsoft.com/office/powerpoint/2010/main" xmlns="" val="3499803322"/>
       </p:ext>
     </p:extLst>
   </p:cSld>
@@ -975,7 +984,7 @@
           <p:cNvPr id="2" name="Title 1">
             <a:extLst>
               <a:ext uri="{FF2B5EF4-FFF2-40B4-BE49-F238E27FC236}">
-                <a16:creationId xmlns:a16="http://schemas.microsoft.com/office/drawing/2014/main" id="{C2F4FF83-2D45-4BC7-892F-8B08D87484BC}"/>
+                <a16:creationId xmlns:a16="http://schemas.microsoft.com/office/drawing/2014/main" xmlns="" id="{C2F4FF83-2D45-4BC7-892F-8B08D87484BC}"/>
               </a:ext>
             </a:extLst>
           </p:cNvPr>
@@ -1013,7 +1022,7 @@
           <p:cNvPr id="3" name="Text Placeholder 2">
             <a:extLst>
               <a:ext uri="{FF2B5EF4-FFF2-40B4-BE49-F238E27FC236}">
-                <a16:creationId xmlns:a16="http://schemas.microsoft.com/office/drawing/2014/main" id="{75CC5990-CF7B-4B48-A0B4-B9FA9E4D5A55}"/>
+                <a16:creationId xmlns:a16="http://schemas.microsoft.com/office/drawing/2014/main" xmlns="" id="{75CC5990-CF7B-4B48-A0B4-B9FA9E4D5A55}"/>
               </a:ext>
             </a:extLst>
           </p:cNvPr>
@@ -1138,7 +1147,7 @@
           <p:cNvPr id="4" name="Date Placeholder 3">
             <a:extLst>
               <a:ext uri="{FF2B5EF4-FFF2-40B4-BE49-F238E27FC236}">
-                <a16:creationId xmlns:a16="http://schemas.microsoft.com/office/drawing/2014/main" id="{FCC2BCD8-23C8-4CD5-BF1A-9E94C6623951}"/>
+                <a16:creationId xmlns:a16="http://schemas.microsoft.com/office/drawing/2014/main" xmlns="" id="{FCC2BCD8-23C8-4CD5-BF1A-9E94C6623951}"/>
               </a:ext>
             </a:extLst>
           </p:cNvPr>
@@ -1156,7 +1165,8 @@
           <a:p>
             <a:fld id="{F6036212-B8CF-409C-B496-D16CDAE2BAE2}" type="datetimeFigureOut">
               <a:rPr lang="en-IN" smtClean="0"/>
-              <a:t>03-07-2018</a:t>
+              <a:pPr/>
+              <a:t>04-04-2019</a:t>
             </a:fld>
             <a:endParaRPr lang="en-IN"/>
           </a:p>
@@ -1167,7 +1177,7 @@
           <p:cNvPr id="5" name="Footer Placeholder 4">
             <a:extLst>
               <a:ext uri="{FF2B5EF4-FFF2-40B4-BE49-F238E27FC236}">
-                <a16:creationId xmlns:a16="http://schemas.microsoft.com/office/drawing/2014/main" id="{430218B0-7F1D-4525-926F-06F68764A8EE}"/>
+                <a16:creationId xmlns:a16="http://schemas.microsoft.com/office/drawing/2014/main" xmlns="" id="{430218B0-7F1D-4525-926F-06F68764A8EE}"/>
               </a:ext>
             </a:extLst>
           </p:cNvPr>
@@ -1192,7 +1202,7 @@
           <p:cNvPr id="6" name="Slide Number Placeholder 5">
             <a:extLst>
               <a:ext uri="{FF2B5EF4-FFF2-40B4-BE49-F238E27FC236}">
-                <a16:creationId xmlns:a16="http://schemas.microsoft.com/office/drawing/2014/main" id="{AB8D0CEE-74E2-4A0A-B111-8B59AE6CE527}"/>
+                <a16:creationId xmlns:a16="http://schemas.microsoft.com/office/drawing/2014/main" xmlns="" id="{AB8D0CEE-74E2-4A0A-B111-8B59AE6CE527}"/>
               </a:ext>
             </a:extLst>
           </p:cNvPr>
@@ -1210,6 +1220,7 @@
           <a:p>
             <a:fld id="{A348748B-0C38-4EC9-B201-E2410E4C4195}" type="slidenum">
               <a:rPr lang="en-IN" smtClean="0"/>
+              <a:pPr/>
               <a:t>‹#›</a:t>
             </a:fld>
             <a:endParaRPr lang="en-IN"/>
@@ -1219,7 +1230,7 @@
     </p:spTree>
     <p:extLst>
       <p:ext uri="{BB962C8B-B14F-4D97-AF65-F5344CB8AC3E}">
-        <p14:creationId xmlns:p14="http://schemas.microsoft.com/office/powerpoint/2010/main" val="3523644042"/>
+        <p14:creationId xmlns:p14="http://schemas.microsoft.com/office/powerpoint/2010/main" xmlns="" val="3523644042"/>
       </p:ext>
     </p:extLst>
   </p:cSld>
@@ -1251,7 +1262,7 @@
           <p:cNvPr id="2" name="Title 1">
             <a:extLst>
               <a:ext uri="{FF2B5EF4-FFF2-40B4-BE49-F238E27FC236}">
-                <a16:creationId xmlns:a16="http://schemas.microsoft.com/office/drawing/2014/main" id="{6053DBC2-2571-4980-BFEF-B3FDF7BCD2DB}"/>
+                <a16:creationId xmlns:a16="http://schemas.microsoft.com/office/drawing/2014/main" xmlns="" id="{6053DBC2-2571-4980-BFEF-B3FDF7BCD2DB}"/>
               </a:ext>
             </a:extLst>
           </p:cNvPr>
@@ -1280,7 +1291,7 @@
           <p:cNvPr id="3" name="Content Placeholder 2">
             <a:extLst>
               <a:ext uri="{FF2B5EF4-FFF2-40B4-BE49-F238E27FC236}">
-                <a16:creationId xmlns:a16="http://schemas.microsoft.com/office/drawing/2014/main" id="{2CB52BDD-8021-4AE7-AEBA-4DCEC8E752F2}"/>
+                <a16:creationId xmlns:a16="http://schemas.microsoft.com/office/drawing/2014/main" xmlns="" id="{2CB52BDD-8021-4AE7-AEBA-4DCEC8E752F2}"/>
               </a:ext>
             </a:extLst>
           </p:cNvPr>
@@ -1343,7 +1354,7 @@
           <p:cNvPr id="4" name="Content Placeholder 3">
             <a:extLst>
               <a:ext uri="{FF2B5EF4-FFF2-40B4-BE49-F238E27FC236}">
-                <a16:creationId xmlns:a16="http://schemas.microsoft.com/office/drawing/2014/main" id="{F007B33F-379E-47EE-ABF5-80BAA2F7E0BD}"/>
+                <a16:creationId xmlns:a16="http://schemas.microsoft.com/office/drawing/2014/main" xmlns="" id="{F007B33F-379E-47EE-ABF5-80BAA2F7E0BD}"/>
               </a:ext>
             </a:extLst>
           </p:cNvPr>
@@ -1406,7 +1417,7 @@
           <p:cNvPr id="5" name="Date Placeholder 4">
             <a:extLst>
               <a:ext uri="{FF2B5EF4-FFF2-40B4-BE49-F238E27FC236}">
-                <a16:creationId xmlns:a16="http://schemas.microsoft.com/office/drawing/2014/main" id="{EAFF873D-6F73-463F-BC4E-0BFFA487F5B5}"/>
+                <a16:creationId xmlns:a16="http://schemas.microsoft.com/office/drawing/2014/main" xmlns="" id="{EAFF873D-6F73-463F-BC4E-0BFFA487F5B5}"/>
               </a:ext>
             </a:extLst>
           </p:cNvPr>
@@ -1424,7 +1435,8 @@
           <a:p>
             <a:fld id="{F6036212-B8CF-409C-B496-D16CDAE2BAE2}" type="datetimeFigureOut">
               <a:rPr lang="en-IN" smtClean="0"/>
-              <a:t>03-07-2018</a:t>
+              <a:pPr/>
+              <a:t>04-04-2019</a:t>
             </a:fld>
             <a:endParaRPr lang="en-IN"/>
           </a:p>
@@ -1435,7 +1447,7 @@
           <p:cNvPr id="6" name="Footer Placeholder 5">
             <a:extLst>
               <a:ext uri="{FF2B5EF4-FFF2-40B4-BE49-F238E27FC236}">
-                <a16:creationId xmlns:a16="http://schemas.microsoft.com/office/drawing/2014/main" id="{79D57FD6-8DE4-4A6D-8783-DC8F0FF723B3}"/>
+                <a16:creationId xmlns:a16="http://schemas.microsoft.com/office/drawing/2014/main" xmlns="" id="{79D57FD6-8DE4-4A6D-8783-DC8F0FF723B3}"/>
               </a:ext>
             </a:extLst>
           </p:cNvPr>
@@ -1460,7 +1472,7 @@
           <p:cNvPr id="7" name="Slide Number Placeholder 6">
             <a:extLst>
               <a:ext uri="{FF2B5EF4-FFF2-40B4-BE49-F238E27FC236}">
-                <a16:creationId xmlns:a16="http://schemas.microsoft.com/office/drawing/2014/main" id="{ECEA4E61-4E8C-4D53-A408-290EEFF25422}"/>
+                <a16:creationId xmlns:a16="http://schemas.microsoft.com/office/drawing/2014/main" xmlns="" id="{ECEA4E61-4E8C-4D53-A408-290EEFF25422}"/>
               </a:ext>
             </a:extLst>
           </p:cNvPr>
@@ -1478,6 +1490,7 @@
           <a:p>
             <a:fld id="{A348748B-0C38-4EC9-B201-E2410E4C4195}" type="slidenum">
               <a:rPr lang="en-IN" smtClean="0"/>
+              <a:pPr/>
               <a:t>‹#›</a:t>
             </a:fld>
             <a:endParaRPr lang="en-IN"/>
@@ -1487,7 +1500,7 @@
     </p:spTree>
     <p:extLst>
       <p:ext uri="{BB962C8B-B14F-4D97-AF65-F5344CB8AC3E}">
-        <p14:creationId xmlns:p14="http://schemas.microsoft.com/office/powerpoint/2010/main" val="4294688286"/>
+        <p14:creationId xmlns:p14="http://schemas.microsoft.com/office/powerpoint/2010/main" xmlns="" val="4294688286"/>
       </p:ext>
     </p:extLst>
   </p:cSld>
@@ -1519,7 +1532,7 @@
           <p:cNvPr id="2" name="Title 1">
             <a:extLst>
               <a:ext uri="{FF2B5EF4-FFF2-40B4-BE49-F238E27FC236}">
-                <a16:creationId xmlns:a16="http://schemas.microsoft.com/office/drawing/2014/main" id="{DCFCC71E-E2E6-43EE-ACB1-874D54A2AC3A}"/>
+                <a16:creationId xmlns:a16="http://schemas.microsoft.com/office/drawing/2014/main" xmlns="" id="{DCFCC71E-E2E6-43EE-ACB1-874D54A2AC3A}"/>
               </a:ext>
             </a:extLst>
           </p:cNvPr>
@@ -1553,7 +1566,7 @@
           <p:cNvPr id="3" name="Text Placeholder 2">
             <a:extLst>
               <a:ext uri="{FF2B5EF4-FFF2-40B4-BE49-F238E27FC236}">
-                <a16:creationId xmlns:a16="http://schemas.microsoft.com/office/drawing/2014/main" id="{76C9A64D-1D03-4FD1-AC5C-BF614417B899}"/>
+                <a16:creationId xmlns:a16="http://schemas.microsoft.com/office/drawing/2014/main" xmlns="" id="{76C9A64D-1D03-4FD1-AC5C-BF614417B899}"/>
               </a:ext>
             </a:extLst>
           </p:cNvPr>
@@ -1624,7 +1637,7 @@
           <p:cNvPr id="4" name="Content Placeholder 3">
             <a:extLst>
               <a:ext uri="{FF2B5EF4-FFF2-40B4-BE49-F238E27FC236}">
-                <a16:creationId xmlns:a16="http://schemas.microsoft.com/office/drawing/2014/main" id="{26E32636-8BCA-488A-B1B7-3427D19C8117}"/>
+                <a16:creationId xmlns:a16="http://schemas.microsoft.com/office/drawing/2014/main" xmlns="" id="{26E32636-8BCA-488A-B1B7-3427D19C8117}"/>
               </a:ext>
             </a:extLst>
           </p:cNvPr>
@@ -1687,7 +1700,7 @@
           <p:cNvPr id="5" name="Text Placeholder 4">
             <a:extLst>
               <a:ext uri="{FF2B5EF4-FFF2-40B4-BE49-F238E27FC236}">
-                <a16:creationId xmlns:a16="http://schemas.microsoft.com/office/drawing/2014/main" id="{DA670566-2D53-4318-89F9-E14F35D240B7}"/>
+                <a16:creationId xmlns:a16="http://schemas.microsoft.com/office/drawing/2014/main" xmlns="" id="{DA670566-2D53-4318-89F9-E14F35D240B7}"/>
               </a:ext>
             </a:extLst>
           </p:cNvPr>
@@ -1758,7 +1771,7 @@
           <p:cNvPr id="6" name="Content Placeholder 5">
             <a:extLst>
               <a:ext uri="{FF2B5EF4-FFF2-40B4-BE49-F238E27FC236}">
-                <a16:creationId xmlns:a16="http://schemas.microsoft.com/office/drawing/2014/main" id="{82E245FB-662C-463D-A87B-C14DD3501B57}"/>
+                <a16:creationId xmlns:a16="http://schemas.microsoft.com/office/drawing/2014/main" xmlns="" id="{82E245FB-662C-463D-A87B-C14DD3501B57}"/>
               </a:ext>
             </a:extLst>
           </p:cNvPr>
@@ -1821,7 +1834,7 @@
           <p:cNvPr id="7" name="Date Placeholder 6">
             <a:extLst>
               <a:ext uri="{FF2B5EF4-FFF2-40B4-BE49-F238E27FC236}">
-                <a16:creationId xmlns:a16="http://schemas.microsoft.com/office/drawing/2014/main" id="{69C65D29-2DCC-4536-A6E1-E4C5212F708A}"/>
+                <a16:creationId xmlns:a16="http://schemas.microsoft.com/office/drawing/2014/main" xmlns="" id="{69C65D29-2DCC-4536-A6E1-E4C5212F708A}"/>
               </a:ext>
             </a:extLst>
           </p:cNvPr>
@@ -1839,7 +1852,8 @@
           <a:p>
             <a:fld id="{F6036212-B8CF-409C-B496-D16CDAE2BAE2}" type="datetimeFigureOut">
               <a:rPr lang="en-IN" smtClean="0"/>
-              <a:t>03-07-2018</a:t>
+              <a:pPr/>
+              <a:t>04-04-2019</a:t>
             </a:fld>
             <a:endParaRPr lang="en-IN"/>
           </a:p>
@@ -1850,7 +1864,7 @@
           <p:cNvPr id="8" name="Footer Placeholder 7">
             <a:extLst>
               <a:ext uri="{FF2B5EF4-FFF2-40B4-BE49-F238E27FC236}">
-                <a16:creationId xmlns:a16="http://schemas.microsoft.com/office/drawing/2014/main" id="{9EE4C362-151F-4EDB-B927-B76403B03DB6}"/>
+                <a16:creationId xmlns:a16="http://schemas.microsoft.com/office/drawing/2014/main" xmlns="" id="{9EE4C362-151F-4EDB-B927-B76403B03DB6}"/>
               </a:ext>
             </a:extLst>
           </p:cNvPr>
@@ -1875,7 +1889,7 @@
           <p:cNvPr id="9" name="Slide Number Placeholder 8">
             <a:extLst>
               <a:ext uri="{FF2B5EF4-FFF2-40B4-BE49-F238E27FC236}">
-                <a16:creationId xmlns:a16="http://schemas.microsoft.com/office/drawing/2014/main" id="{CA7782B4-EFAB-4932-BE8C-0BD981836724}"/>
+                <a16:creationId xmlns:a16="http://schemas.microsoft.com/office/drawing/2014/main" xmlns="" id="{CA7782B4-EFAB-4932-BE8C-0BD981836724}"/>
               </a:ext>
             </a:extLst>
           </p:cNvPr>
@@ -1893,6 +1907,7 @@
           <a:p>
             <a:fld id="{A348748B-0C38-4EC9-B201-E2410E4C4195}" type="slidenum">
               <a:rPr lang="en-IN" smtClean="0"/>
+              <a:pPr/>
               <a:t>‹#›</a:t>
             </a:fld>
             <a:endParaRPr lang="en-IN"/>
@@ -1902,7 +1917,7 @@
     </p:spTree>
     <p:extLst>
       <p:ext uri="{BB962C8B-B14F-4D97-AF65-F5344CB8AC3E}">
-        <p14:creationId xmlns:p14="http://schemas.microsoft.com/office/powerpoint/2010/main" val="3370079201"/>
+        <p14:creationId xmlns:p14="http://schemas.microsoft.com/office/powerpoint/2010/main" xmlns="" val="3370079201"/>
       </p:ext>
     </p:extLst>
   </p:cSld>
@@ -1934,7 +1949,7 @@
           <p:cNvPr id="2" name="Title 1">
             <a:extLst>
               <a:ext uri="{FF2B5EF4-FFF2-40B4-BE49-F238E27FC236}">
-                <a16:creationId xmlns:a16="http://schemas.microsoft.com/office/drawing/2014/main" id="{9914B97D-669D-4F8B-817D-759622A36239}"/>
+                <a16:creationId xmlns:a16="http://schemas.microsoft.com/office/drawing/2014/main" xmlns="" id="{9914B97D-669D-4F8B-817D-759622A36239}"/>
               </a:ext>
             </a:extLst>
           </p:cNvPr>
@@ -1963,7 +1978,7 @@
           <p:cNvPr id="3" name="Date Placeholder 2">
             <a:extLst>
               <a:ext uri="{FF2B5EF4-FFF2-40B4-BE49-F238E27FC236}">
-                <a16:creationId xmlns:a16="http://schemas.microsoft.com/office/drawing/2014/main" id="{A3AFBA8E-2076-42D6-B654-54740311B884}"/>
+                <a16:creationId xmlns:a16="http://schemas.microsoft.com/office/drawing/2014/main" xmlns="" id="{A3AFBA8E-2076-42D6-B654-54740311B884}"/>
               </a:ext>
             </a:extLst>
           </p:cNvPr>
@@ -1981,7 +1996,8 @@
           <a:p>
             <a:fld id="{F6036212-B8CF-409C-B496-D16CDAE2BAE2}" type="datetimeFigureOut">
               <a:rPr lang="en-IN" smtClean="0"/>
-              <a:t>03-07-2018</a:t>
+              <a:pPr/>
+              <a:t>04-04-2019</a:t>
             </a:fld>
             <a:endParaRPr lang="en-IN"/>
           </a:p>
@@ -1992,7 +2008,7 @@
           <p:cNvPr id="4" name="Footer Placeholder 3">
             <a:extLst>
               <a:ext uri="{FF2B5EF4-FFF2-40B4-BE49-F238E27FC236}">
-                <a16:creationId xmlns:a16="http://schemas.microsoft.com/office/drawing/2014/main" id="{EDD08887-72C8-4A3E-B263-C871F0812FD5}"/>
+                <a16:creationId xmlns:a16="http://schemas.microsoft.com/office/drawing/2014/main" xmlns="" id="{EDD08887-72C8-4A3E-B263-C871F0812FD5}"/>
               </a:ext>
             </a:extLst>
           </p:cNvPr>
@@ -2017,7 +2033,7 @@
           <p:cNvPr id="5" name="Slide Number Placeholder 4">
             <a:extLst>
               <a:ext uri="{FF2B5EF4-FFF2-40B4-BE49-F238E27FC236}">
-                <a16:creationId xmlns:a16="http://schemas.microsoft.com/office/drawing/2014/main" id="{2DA24376-DAC7-4619-A695-9E0211EFAC64}"/>
+                <a16:creationId xmlns:a16="http://schemas.microsoft.com/office/drawing/2014/main" xmlns="" id="{2DA24376-DAC7-4619-A695-9E0211EFAC64}"/>
               </a:ext>
             </a:extLst>
           </p:cNvPr>
@@ -2035,6 +2051,7 @@
           <a:p>
             <a:fld id="{A348748B-0C38-4EC9-B201-E2410E4C4195}" type="slidenum">
               <a:rPr lang="en-IN" smtClean="0"/>
+              <a:pPr/>
               <a:t>‹#›</a:t>
             </a:fld>
             <a:endParaRPr lang="en-IN"/>
@@ -2044,7 +2061,7 @@
     </p:spTree>
     <p:extLst>
       <p:ext uri="{BB962C8B-B14F-4D97-AF65-F5344CB8AC3E}">
-        <p14:creationId xmlns:p14="http://schemas.microsoft.com/office/powerpoint/2010/main" val="2289369049"/>
+        <p14:creationId xmlns:p14="http://schemas.microsoft.com/office/powerpoint/2010/main" xmlns="" val="2289369049"/>
       </p:ext>
     </p:extLst>
   </p:cSld>
@@ -2076,7 +2093,7 @@
           <p:cNvPr id="2" name="Date Placeholder 1">
             <a:extLst>
               <a:ext uri="{FF2B5EF4-FFF2-40B4-BE49-F238E27FC236}">
-                <a16:creationId xmlns:a16="http://schemas.microsoft.com/office/drawing/2014/main" id="{6984EA0D-AD20-43A2-BD66-F442C6349EC1}"/>
+                <a16:creationId xmlns:a16="http://schemas.microsoft.com/office/drawing/2014/main" xmlns="" id="{6984EA0D-AD20-43A2-BD66-F442C6349EC1}"/>
               </a:ext>
             </a:extLst>
           </p:cNvPr>
@@ -2094,7 +2111,8 @@
           <a:p>
             <a:fld id="{F6036212-B8CF-409C-B496-D16CDAE2BAE2}" type="datetimeFigureOut">
               <a:rPr lang="en-IN" smtClean="0"/>
-              <a:t>03-07-2018</a:t>
+              <a:pPr/>
+              <a:t>04-04-2019</a:t>
             </a:fld>
             <a:endParaRPr lang="en-IN"/>
           </a:p>
@@ -2105,7 +2123,7 @@
           <p:cNvPr id="3" name="Footer Placeholder 2">
             <a:extLst>
               <a:ext uri="{FF2B5EF4-FFF2-40B4-BE49-F238E27FC236}">
-                <a16:creationId xmlns:a16="http://schemas.microsoft.com/office/drawing/2014/main" id="{A0686A85-2607-44EF-B695-EF6BB5112A63}"/>
+                <a16:creationId xmlns:a16="http://schemas.microsoft.com/office/drawing/2014/main" xmlns="" id="{A0686A85-2607-44EF-B695-EF6BB5112A63}"/>
               </a:ext>
             </a:extLst>
           </p:cNvPr>
@@ -2130,7 +2148,7 @@
           <p:cNvPr id="4" name="Slide Number Placeholder 3">
             <a:extLst>
               <a:ext uri="{FF2B5EF4-FFF2-40B4-BE49-F238E27FC236}">
-                <a16:creationId xmlns:a16="http://schemas.microsoft.com/office/drawing/2014/main" id="{3854599B-D4DE-4325-B710-176B211EFAA5}"/>
+                <a16:creationId xmlns:a16="http://schemas.microsoft.com/office/drawing/2014/main" xmlns="" id="{3854599B-D4DE-4325-B710-176B211EFAA5}"/>
               </a:ext>
             </a:extLst>
           </p:cNvPr>
@@ -2148,6 +2166,7 @@
           <a:p>
             <a:fld id="{A348748B-0C38-4EC9-B201-E2410E4C4195}" type="slidenum">
               <a:rPr lang="en-IN" smtClean="0"/>
+              <a:pPr/>
               <a:t>‹#›</a:t>
             </a:fld>
             <a:endParaRPr lang="en-IN"/>
@@ -2157,7 +2176,7 @@
     </p:spTree>
     <p:extLst>
       <p:ext uri="{BB962C8B-B14F-4D97-AF65-F5344CB8AC3E}">
-        <p14:creationId xmlns:p14="http://schemas.microsoft.com/office/powerpoint/2010/main" val="2833320983"/>
+        <p14:creationId xmlns:p14="http://schemas.microsoft.com/office/powerpoint/2010/main" xmlns="" val="2833320983"/>
       </p:ext>
     </p:extLst>
   </p:cSld>
@@ -2189,7 +2208,7 @@
           <p:cNvPr id="2" name="Title 1">
             <a:extLst>
               <a:ext uri="{FF2B5EF4-FFF2-40B4-BE49-F238E27FC236}">
-                <a16:creationId xmlns:a16="http://schemas.microsoft.com/office/drawing/2014/main" id="{B976E274-8EB8-4FE2-9C02-0AE61F372C30}"/>
+                <a16:creationId xmlns:a16="http://schemas.microsoft.com/office/drawing/2014/main" xmlns="" id="{B976E274-8EB8-4FE2-9C02-0AE61F372C30}"/>
               </a:ext>
             </a:extLst>
           </p:cNvPr>
@@ -2227,7 +2246,7 @@
           <p:cNvPr id="3" name="Content Placeholder 2">
             <a:extLst>
               <a:ext uri="{FF2B5EF4-FFF2-40B4-BE49-F238E27FC236}">
-                <a16:creationId xmlns:a16="http://schemas.microsoft.com/office/drawing/2014/main" id="{EEDF927D-0689-4231-8C5B-943D63B630CB}"/>
+                <a16:creationId xmlns:a16="http://schemas.microsoft.com/office/drawing/2014/main" xmlns="" id="{EEDF927D-0689-4231-8C5B-943D63B630CB}"/>
               </a:ext>
             </a:extLst>
           </p:cNvPr>
@@ -2318,7 +2337,7 @@
           <p:cNvPr id="4" name="Text Placeholder 3">
             <a:extLst>
               <a:ext uri="{FF2B5EF4-FFF2-40B4-BE49-F238E27FC236}">
-                <a16:creationId xmlns:a16="http://schemas.microsoft.com/office/drawing/2014/main" id="{424CA85B-6224-405C-A647-039AA03384C7}"/>
+                <a16:creationId xmlns:a16="http://schemas.microsoft.com/office/drawing/2014/main" xmlns="" id="{424CA85B-6224-405C-A647-039AA03384C7}"/>
               </a:ext>
             </a:extLst>
           </p:cNvPr>
@@ -2389,7 +2408,7 @@
           <p:cNvPr id="5" name="Date Placeholder 4">
             <a:extLst>
               <a:ext uri="{FF2B5EF4-FFF2-40B4-BE49-F238E27FC236}">
-                <a16:creationId xmlns:a16="http://schemas.microsoft.com/office/drawing/2014/main" id="{6A86A9E6-82DE-4CE3-93C4-71F70A8CF543}"/>
+                <a16:creationId xmlns:a16="http://schemas.microsoft.com/office/drawing/2014/main" xmlns="" id="{6A86A9E6-82DE-4CE3-93C4-71F70A8CF543}"/>
               </a:ext>
             </a:extLst>
           </p:cNvPr>
@@ -2407,7 +2426,8 @@
           <a:p>
             <a:fld id="{F6036212-B8CF-409C-B496-D16CDAE2BAE2}" type="datetimeFigureOut">
               <a:rPr lang="en-IN" smtClean="0"/>
-              <a:t>03-07-2018</a:t>
+              <a:pPr/>
+              <a:t>04-04-2019</a:t>
             </a:fld>
             <a:endParaRPr lang="en-IN"/>
           </a:p>
@@ -2418,7 +2438,7 @@
           <p:cNvPr id="6" name="Footer Placeholder 5">
             <a:extLst>
               <a:ext uri="{FF2B5EF4-FFF2-40B4-BE49-F238E27FC236}">
-                <a16:creationId xmlns:a16="http://schemas.microsoft.com/office/drawing/2014/main" id="{BB035726-48EE-4819-8561-6C0B642AD8A6}"/>
+                <a16:creationId xmlns:a16="http://schemas.microsoft.com/office/drawing/2014/main" xmlns="" id="{BB035726-48EE-4819-8561-6C0B642AD8A6}"/>
               </a:ext>
             </a:extLst>
           </p:cNvPr>
@@ -2443,7 +2463,7 @@
           <p:cNvPr id="7" name="Slide Number Placeholder 6">
             <a:extLst>
               <a:ext uri="{FF2B5EF4-FFF2-40B4-BE49-F238E27FC236}">
-                <a16:creationId xmlns:a16="http://schemas.microsoft.com/office/drawing/2014/main" id="{AC889F2E-0BF8-4CDE-9B80-AF389D5D5B6F}"/>
+                <a16:creationId xmlns:a16="http://schemas.microsoft.com/office/drawing/2014/main" xmlns="" id="{AC889F2E-0BF8-4CDE-9B80-AF389D5D5B6F}"/>
               </a:ext>
             </a:extLst>
           </p:cNvPr>
@@ -2461,6 +2481,7 @@
           <a:p>
             <a:fld id="{A348748B-0C38-4EC9-B201-E2410E4C4195}" type="slidenum">
               <a:rPr lang="en-IN" smtClean="0"/>
+              <a:pPr/>
               <a:t>‹#›</a:t>
             </a:fld>
             <a:endParaRPr lang="en-IN"/>
@@ -2470,7 +2491,7 @@
     </p:spTree>
     <p:extLst>
       <p:ext uri="{BB962C8B-B14F-4D97-AF65-F5344CB8AC3E}">
-        <p14:creationId xmlns:p14="http://schemas.microsoft.com/office/powerpoint/2010/main" val="1384437547"/>
+        <p14:creationId xmlns:p14="http://schemas.microsoft.com/office/powerpoint/2010/main" xmlns="" val="1384437547"/>
       </p:ext>
     </p:extLst>
   </p:cSld>
@@ -2502,7 +2523,7 @@
           <p:cNvPr id="2" name="Title 1">
             <a:extLst>
               <a:ext uri="{FF2B5EF4-FFF2-40B4-BE49-F238E27FC236}">
-                <a16:creationId xmlns:a16="http://schemas.microsoft.com/office/drawing/2014/main" id="{15375F06-331A-482E-AA33-2DA65B5D792C}"/>
+                <a16:creationId xmlns:a16="http://schemas.microsoft.com/office/drawing/2014/main" xmlns="" id="{15375F06-331A-482E-AA33-2DA65B5D792C}"/>
               </a:ext>
             </a:extLst>
           </p:cNvPr>
@@ -2540,7 +2561,7 @@
           <p:cNvPr id="3" name="Picture Placeholder 2">
             <a:extLst>
               <a:ext uri="{FF2B5EF4-FFF2-40B4-BE49-F238E27FC236}">
-                <a16:creationId xmlns:a16="http://schemas.microsoft.com/office/drawing/2014/main" id="{0E5C9B97-D313-4996-A4FD-07C9C7C81EB0}"/>
+                <a16:creationId xmlns:a16="http://schemas.microsoft.com/office/drawing/2014/main" xmlns="" id="{0E5C9B97-D313-4996-A4FD-07C9C7C81EB0}"/>
               </a:ext>
             </a:extLst>
           </p:cNvPr>
@@ -2607,7 +2628,7 @@
           <p:cNvPr id="4" name="Text Placeholder 3">
             <a:extLst>
               <a:ext uri="{FF2B5EF4-FFF2-40B4-BE49-F238E27FC236}">
-                <a16:creationId xmlns:a16="http://schemas.microsoft.com/office/drawing/2014/main" id="{27CDD1AB-9D8C-43AB-932A-06CBA03B434B}"/>
+                <a16:creationId xmlns:a16="http://schemas.microsoft.com/office/drawing/2014/main" xmlns="" id="{27CDD1AB-9D8C-43AB-932A-06CBA03B434B}"/>
               </a:ext>
             </a:extLst>
           </p:cNvPr>
@@ -2678,7 +2699,7 @@
           <p:cNvPr id="5" name="Date Placeholder 4">
             <a:extLst>
               <a:ext uri="{FF2B5EF4-FFF2-40B4-BE49-F238E27FC236}">
-                <a16:creationId xmlns:a16="http://schemas.microsoft.com/office/drawing/2014/main" id="{4D74C12D-FFDF-4382-BA95-12C9A71C2169}"/>
+                <a16:creationId xmlns:a16="http://schemas.microsoft.com/office/drawing/2014/main" xmlns="" id="{4D74C12D-FFDF-4382-BA95-12C9A71C2169}"/>
               </a:ext>
             </a:extLst>
           </p:cNvPr>
@@ -2696,7 +2717,8 @@
           <a:p>
             <a:fld id="{F6036212-B8CF-409C-B496-D16CDAE2BAE2}" type="datetimeFigureOut">
               <a:rPr lang="en-IN" smtClean="0"/>
-              <a:t>03-07-2018</a:t>
+              <a:pPr/>
+              <a:t>04-04-2019</a:t>
             </a:fld>
             <a:endParaRPr lang="en-IN"/>
           </a:p>
@@ -2707,7 +2729,7 @@
           <p:cNvPr id="6" name="Footer Placeholder 5">
             <a:extLst>
               <a:ext uri="{FF2B5EF4-FFF2-40B4-BE49-F238E27FC236}">
-                <a16:creationId xmlns:a16="http://schemas.microsoft.com/office/drawing/2014/main" id="{E05B401B-191A-47E1-9734-4312A8A8660C}"/>
+                <a16:creationId xmlns:a16="http://schemas.microsoft.com/office/drawing/2014/main" xmlns="" id="{E05B401B-191A-47E1-9734-4312A8A8660C}"/>
               </a:ext>
             </a:extLst>
           </p:cNvPr>
@@ -2732,7 +2754,7 @@
           <p:cNvPr id="7" name="Slide Number Placeholder 6">
             <a:extLst>
               <a:ext uri="{FF2B5EF4-FFF2-40B4-BE49-F238E27FC236}">
-                <a16:creationId xmlns:a16="http://schemas.microsoft.com/office/drawing/2014/main" id="{98E74827-E7F7-4489-A477-127709A94163}"/>
+                <a16:creationId xmlns:a16="http://schemas.microsoft.com/office/drawing/2014/main" xmlns="" id="{98E74827-E7F7-4489-A477-127709A94163}"/>
               </a:ext>
             </a:extLst>
           </p:cNvPr>
@@ -2750,6 +2772,7 @@
           <a:p>
             <a:fld id="{A348748B-0C38-4EC9-B201-E2410E4C4195}" type="slidenum">
               <a:rPr lang="en-IN" smtClean="0"/>
+              <a:pPr/>
               <a:t>‹#›</a:t>
             </a:fld>
             <a:endParaRPr lang="en-IN"/>
@@ -2759,7 +2782,7 @@
     </p:spTree>
     <p:extLst>
       <p:ext uri="{BB962C8B-B14F-4D97-AF65-F5344CB8AC3E}">
-        <p14:creationId xmlns:p14="http://schemas.microsoft.com/office/powerpoint/2010/main" val="1341258449"/>
+        <p14:creationId xmlns:p14="http://schemas.microsoft.com/office/powerpoint/2010/main" xmlns="" val="1341258449"/>
       </p:ext>
     </p:extLst>
   </p:cSld>
@@ -2796,7 +2819,7 @@
           <p:cNvPr id="2" name="Title Placeholder 1">
             <a:extLst>
               <a:ext uri="{FF2B5EF4-FFF2-40B4-BE49-F238E27FC236}">
-                <a16:creationId xmlns:a16="http://schemas.microsoft.com/office/drawing/2014/main" id="{A85524E1-5D2E-4279-82A0-A21E953523B9}"/>
+                <a16:creationId xmlns:a16="http://schemas.microsoft.com/office/drawing/2014/main" xmlns="" id="{A85524E1-5D2E-4279-82A0-A21E953523B9}"/>
               </a:ext>
             </a:extLst>
           </p:cNvPr>
@@ -2835,7 +2858,7 @@
           <p:cNvPr id="3" name="Text Placeholder 2">
             <a:extLst>
               <a:ext uri="{FF2B5EF4-FFF2-40B4-BE49-F238E27FC236}">
-                <a16:creationId xmlns:a16="http://schemas.microsoft.com/office/drawing/2014/main" id="{BD9E69E9-7044-40B8-A82A-51AE1A2F1412}"/>
+                <a16:creationId xmlns:a16="http://schemas.microsoft.com/office/drawing/2014/main" xmlns="" id="{BD9E69E9-7044-40B8-A82A-51AE1A2F1412}"/>
               </a:ext>
             </a:extLst>
           </p:cNvPr>
@@ -2903,7 +2926,7 @@
           <p:cNvPr id="4" name="Date Placeholder 3">
             <a:extLst>
               <a:ext uri="{FF2B5EF4-FFF2-40B4-BE49-F238E27FC236}">
-                <a16:creationId xmlns:a16="http://schemas.microsoft.com/office/drawing/2014/main" id="{414F630C-9200-435B-8C66-72EEDCBBFF19}"/>
+                <a16:creationId xmlns:a16="http://schemas.microsoft.com/office/drawing/2014/main" xmlns="" id="{414F630C-9200-435B-8C66-72EEDCBBFF19}"/>
               </a:ext>
             </a:extLst>
           </p:cNvPr>
@@ -2939,7 +2962,8 @@
           <a:p>
             <a:fld id="{F6036212-B8CF-409C-B496-D16CDAE2BAE2}" type="datetimeFigureOut">
               <a:rPr lang="en-IN" smtClean="0"/>
-              <a:t>03-07-2018</a:t>
+              <a:pPr/>
+              <a:t>04-04-2019</a:t>
             </a:fld>
             <a:endParaRPr lang="en-IN"/>
           </a:p>
@@ -2950,7 +2974,7 @@
           <p:cNvPr id="5" name="Footer Placeholder 4">
             <a:extLst>
               <a:ext uri="{FF2B5EF4-FFF2-40B4-BE49-F238E27FC236}">
-                <a16:creationId xmlns:a16="http://schemas.microsoft.com/office/drawing/2014/main" id="{C5C4349E-364B-4C52-8CCD-AC772CADF546}"/>
+                <a16:creationId xmlns:a16="http://schemas.microsoft.com/office/drawing/2014/main" xmlns="" id="{C5C4349E-364B-4C52-8CCD-AC772CADF546}"/>
               </a:ext>
             </a:extLst>
           </p:cNvPr>
@@ -2993,7 +3017,7 @@
           <p:cNvPr id="6" name="Slide Number Placeholder 5">
             <a:extLst>
               <a:ext uri="{FF2B5EF4-FFF2-40B4-BE49-F238E27FC236}">
-                <a16:creationId xmlns:a16="http://schemas.microsoft.com/office/drawing/2014/main" id="{534CA3CA-09D8-4B18-A4C1-7D07C6575610}"/>
+                <a16:creationId xmlns:a16="http://schemas.microsoft.com/office/drawing/2014/main" xmlns="" id="{534CA3CA-09D8-4B18-A4C1-7D07C6575610}"/>
               </a:ext>
             </a:extLst>
           </p:cNvPr>
@@ -3029,6 +3053,7 @@
           <a:p>
             <a:fld id="{A348748B-0C38-4EC9-B201-E2410E4C4195}" type="slidenum">
               <a:rPr lang="en-IN" smtClean="0"/>
+              <a:pPr/>
               <a:t>‹#›</a:t>
             </a:fld>
             <a:endParaRPr lang="en-IN"/>
@@ -3038,7 +3063,7 @@
     </p:spTree>
     <p:extLst>
       <p:ext uri="{BB962C8B-B14F-4D97-AF65-F5344CB8AC3E}">
-        <p14:creationId xmlns:p14="http://schemas.microsoft.com/office/powerpoint/2010/main" val="3251459394"/>
+        <p14:creationId xmlns:p14="http://schemas.microsoft.com/office/powerpoint/2010/main" xmlns="" val="3251459394"/>
       </p:ext>
     </p:extLst>
   </p:cSld>
@@ -3361,7 +3386,7 @@
           <p:cNvPr id="2" name="Title 1">
             <a:extLst>
               <a:ext uri="{FF2B5EF4-FFF2-40B4-BE49-F238E27FC236}">
-                <a16:creationId xmlns:a16="http://schemas.microsoft.com/office/drawing/2014/main" id="{0F317EDE-8E47-4347-AAAF-41B0E8617464}"/>
+                <a16:creationId xmlns:a16="http://schemas.microsoft.com/office/drawing/2014/main" xmlns="" id="{0F317EDE-8E47-4347-AAAF-41B0E8617464}"/>
               </a:ext>
             </a:extLst>
           </p:cNvPr>
@@ -3390,7 +3415,7 @@
           <p:cNvPr id="3" name="Subtitle 2">
             <a:extLst>
               <a:ext uri="{FF2B5EF4-FFF2-40B4-BE49-F238E27FC236}">
-                <a16:creationId xmlns:a16="http://schemas.microsoft.com/office/drawing/2014/main" id="{FF410D11-D523-4B27-805B-5970C8FB7DCA}"/>
+                <a16:creationId xmlns:a16="http://schemas.microsoft.com/office/drawing/2014/main" xmlns="" id="{FF410D11-D523-4B27-805B-5970C8FB7DCA}"/>
               </a:ext>
             </a:extLst>
           </p:cNvPr>
@@ -3413,7 +3438,7 @@
     </p:spTree>
     <p:extLst>
       <p:ext uri="{BB962C8B-B14F-4D97-AF65-F5344CB8AC3E}">
-        <p14:creationId xmlns:p14="http://schemas.microsoft.com/office/powerpoint/2010/main" val="966184080"/>
+        <p14:creationId xmlns:p14="http://schemas.microsoft.com/office/powerpoint/2010/main" xmlns="" val="966184080"/>
       </p:ext>
     </p:extLst>
   </p:cSld>
@@ -3445,7 +3470,7 @@
           <p:cNvPr id="2" name="Title 1">
             <a:extLst>
               <a:ext uri="{FF2B5EF4-FFF2-40B4-BE49-F238E27FC236}">
-                <a16:creationId xmlns:a16="http://schemas.microsoft.com/office/drawing/2014/main" id="{F6AF062E-A2BA-407D-A72C-77B7B3CFA3F3}"/>
+                <a16:creationId xmlns:a16="http://schemas.microsoft.com/office/drawing/2014/main" xmlns="" id="{F6AF062E-A2BA-407D-A72C-77B7B3CFA3F3}"/>
               </a:ext>
             </a:extLst>
           </p:cNvPr>
@@ -3474,7 +3499,7 @@
           <p:cNvPr id="3" name="Content Placeholder 2">
             <a:extLst>
               <a:ext uri="{FF2B5EF4-FFF2-40B4-BE49-F238E27FC236}">
-                <a16:creationId xmlns:a16="http://schemas.microsoft.com/office/drawing/2014/main" id="{423719D5-9334-4C01-834F-3B2258B7E053}"/>
+                <a16:creationId xmlns:a16="http://schemas.microsoft.com/office/drawing/2014/main" xmlns="" id="{423719D5-9334-4C01-834F-3B2258B7E053}"/>
               </a:ext>
             </a:extLst>
           </p:cNvPr>
@@ -3512,7 +3537,7 @@
     </p:spTree>
     <p:extLst>
       <p:ext uri="{BB962C8B-B14F-4D97-AF65-F5344CB8AC3E}">
-        <p14:creationId xmlns:p14="http://schemas.microsoft.com/office/powerpoint/2010/main" val="2664351056"/>
+        <p14:creationId xmlns:p14="http://schemas.microsoft.com/office/powerpoint/2010/main" xmlns="" val="2664351056"/>
       </p:ext>
     </p:extLst>
   </p:cSld>
@@ -3544,7 +3569,7 @@
           <p:cNvPr id="2" name="Title 1">
             <a:extLst>
               <a:ext uri="{FF2B5EF4-FFF2-40B4-BE49-F238E27FC236}">
-                <a16:creationId xmlns:a16="http://schemas.microsoft.com/office/drawing/2014/main" id="{EDBEDA07-1C36-4BED-A180-37FDB5E655F5}"/>
+                <a16:creationId xmlns:a16="http://schemas.microsoft.com/office/drawing/2014/main" xmlns="" id="{EDBEDA07-1C36-4BED-A180-37FDB5E655F5}"/>
               </a:ext>
             </a:extLst>
           </p:cNvPr>
@@ -3573,7 +3598,7 @@
           <p:cNvPr id="3" name="Content Placeholder 2">
             <a:extLst>
               <a:ext uri="{FF2B5EF4-FFF2-40B4-BE49-F238E27FC236}">
-                <a16:creationId xmlns:a16="http://schemas.microsoft.com/office/drawing/2014/main" id="{9A6A7F74-6E39-425A-AC52-A398EFACC1DD}"/>
+                <a16:creationId xmlns:a16="http://schemas.microsoft.com/office/drawing/2014/main" xmlns="" id="{9A6A7F74-6E39-425A-AC52-A398EFACC1DD}"/>
               </a:ext>
             </a:extLst>
           </p:cNvPr>
@@ -3616,7 +3641,7 @@
           <p:cNvPr id="4" name="Rectangle 3">
             <a:extLst>
               <a:ext uri="{FF2B5EF4-FFF2-40B4-BE49-F238E27FC236}">
-                <a16:creationId xmlns:a16="http://schemas.microsoft.com/office/drawing/2014/main" id="{93C1AF8A-84AD-443A-A33C-9CF20FFFB716}"/>
+                <a16:creationId xmlns:a16="http://schemas.microsoft.com/office/drawing/2014/main" xmlns="" id="{93C1AF8A-84AD-443A-A33C-9CF20FFFB716}"/>
               </a:ext>
             </a:extLst>
           </p:cNvPr>
@@ -3667,7 +3692,7 @@
     </p:spTree>
     <p:extLst>
       <p:ext uri="{BB962C8B-B14F-4D97-AF65-F5344CB8AC3E}">
-        <p14:creationId xmlns:p14="http://schemas.microsoft.com/office/powerpoint/2010/main" val="286282533"/>
+        <p14:creationId xmlns:p14="http://schemas.microsoft.com/office/powerpoint/2010/main" xmlns="" val="286282533"/>
       </p:ext>
     </p:extLst>
   </p:cSld>
@@ -3699,7 +3724,7 @@
           <p:cNvPr id="2" name="Title 1">
             <a:extLst>
               <a:ext uri="{FF2B5EF4-FFF2-40B4-BE49-F238E27FC236}">
-                <a16:creationId xmlns:a16="http://schemas.microsoft.com/office/drawing/2014/main" id="{453DD5E7-1673-4554-B738-A7BB5FCD8182}"/>
+                <a16:creationId xmlns:a16="http://schemas.microsoft.com/office/drawing/2014/main" xmlns="" id="{453DD5E7-1673-4554-B738-A7BB5FCD8182}"/>
               </a:ext>
             </a:extLst>
           </p:cNvPr>
@@ -3731,7 +3756,7 @@
           <p:cNvPr id="3" name="Content Placeholder 2">
             <a:extLst>
               <a:ext uri="{FF2B5EF4-FFF2-40B4-BE49-F238E27FC236}">
-                <a16:creationId xmlns:a16="http://schemas.microsoft.com/office/drawing/2014/main" id="{E1BD6D97-45D7-407B-806B-98A037B251EF}"/>
+                <a16:creationId xmlns:a16="http://schemas.microsoft.com/office/drawing/2014/main" xmlns="" id="{E1BD6D97-45D7-407B-806B-98A037B251EF}"/>
               </a:ext>
             </a:extLst>
           </p:cNvPr>
@@ -3914,7 +3939,7 @@
           <p:cNvPr id="4" name="Picture 3">
             <a:extLst>
               <a:ext uri="{FF2B5EF4-FFF2-40B4-BE49-F238E27FC236}">
-                <a16:creationId xmlns:a16="http://schemas.microsoft.com/office/drawing/2014/main" id="{1379CC98-5AC4-40CC-B626-319992C11F17}"/>
+                <a16:creationId xmlns:a16="http://schemas.microsoft.com/office/drawing/2014/main" xmlns="" id="{1379CC98-5AC4-40CC-B626-319992C11F17}"/>
               </a:ext>
             </a:extLst>
           </p:cNvPr>
@@ -3942,7 +3967,7 @@
     </p:spTree>
     <p:extLst>
       <p:ext uri="{BB962C8B-B14F-4D97-AF65-F5344CB8AC3E}">
-        <p14:creationId xmlns:p14="http://schemas.microsoft.com/office/powerpoint/2010/main" val="4030152411"/>
+        <p14:creationId xmlns:p14="http://schemas.microsoft.com/office/powerpoint/2010/main" xmlns="" val="4030152411"/>
       </p:ext>
     </p:extLst>
   </p:cSld>
@@ -3974,7 +3999,7 @@
           <p:cNvPr id="3" name="Content Placeholder 2">
             <a:extLst>
               <a:ext uri="{FF2B5EF4-FFF2-40B4-BE49-F238E27FC236}">
-                <a16:creationId xmlns:a16="http://schemas.microsoft.com/office/drawing/2014/main" id="{3C87C31C-DF98-4EE8-ADE5-F3B7C03CA49C}"/>
+                <a16:creationId xmlns:a16="http://schemas.microsoft.com/office/drawing/2014/main" xmlns="" id="{3C87C31C-DF98-4EE8-ADE5-F3B7C03CA49C}"/>
               </a:ext>
             </a:extLst>
           </p:cNvPr>
@@ -4023,7 +4048,7 @@
           <p:cNvPr id="4" name="Rectangle 3">
             <a:extLst>
               <a:ext uri="{FF2B5EF4-FFF2-40B4-BE49-F238E27FC236}">
-                <a16:creationId xmlns:a16="http://schemas.microsoft.com/office/drawing/2014/main" id="{7B0B9449-4F4F-4D16-81D3-5A4ED2B59913}"/>
+                <a16:creationId xmlns:a16="http://schemas.microsoft.com/office/drawing/2014/main" xmlns="" id="{7B0B9449-4F4F-4D16-81D3-5A4ED2B59913}"/>
               </a:ext>
             </a:extLst>
           </p:cNvPr>
@@ -4070,7 +4095,7 @@
     </p:spTree>
     <p:extLst>
       <p:ext uri="{BB962C8B-B14F-4D97-AF65-F5344CB8AC3E}">
-        <p14:creationId xmlns:p14="http://schemas.microsoft.com/office/powerpoint/2010/main" val="2774199271"/>
+        <p14:creationId xmlns:p14="http://schemas.microsoft.com/office/powerpoint/2010/main" xmlns="" val="2774199271"/>
       </p:ext>
     </p:extLst>
   </p:cSld>
@@ -4102,7 +4127,7 @@
           <p:cNvPr id="2" name="Title 1">
             <a:extLst>
               <a:ext uri="{FF2B5EF4-FFF2-40B4-BE49-F238E27FC236}">
-                <a16:creationId xmlns:a16="http://schemas.microsoft.com/office/drawing/2014/main" id="{81BF9B46-CDF6-4552-A4F4-7CF7B70A1B95}"/>
+                <a16:creationId xmlns:a16="http://schemas.microsoft.com/office/drawing/2014/main" xmlns="" id="{81BF9B46-CDF6-4552-A4F4-7CF7B70A1B95}"/>
               </a:ext>
             </a:extLst>
           </p:cNvPr>
@@ -4135,7 +4160,7 @@
           <p:cNvPr id="3" name="Content Placeholder 2">
             <a:extLst>
               <a:ext uri="{FF2B5EF4-FFF2-40B4-BE49-F238E27FC236}">
-                <a16:creationId xmlns:a16="http://schemas.microsoft.com/office/drawing/2014/main" id="{23D5D178-2DE8-4654-9D15-E044DB599A1A}"/>
+                <a16:creationId xmlns:a16="http://schemas.microsoft.com/office/drawing/2014/main" xmlns="" id="{23D5D178-2DE8-4654-9D15-E044DB599A1A}"/>
               </a:ext>
             </a:extLst>
           </p:cNvPr>
@@ -4185,9 +4210,245 @@
     </p:spTree>
     <p:extLst>
       <p:ext uri="{BB962C8B-B14F-4D97-AF65-F5344CB8AC3E}">
-        <p14:creationId xmlns:p14="http://schemas.microsoft.com/office/powerpoint/2010/main" val="3991332575"/>
+        <p14:creationId xmlns:p14="http://schemas.microsoft.com/office/powerpoint/2010/main" xmlns="" val="3991332575"/>
       </p:ext>
     </p:extLst>
+  </p:cSld>
+  <p:clrMapOvr>
+    <a:masterClrMapping/>
+  </p:clrMapOvr>
+</p:sld>
+</file>
+
+<file path=ppt/slides/slide7.xml><?xml version="1.0" encoding="utf-8"?>
+<p:sld xmlns:a="http://schemas.openxmlformats.org/drawingml/2006/main" xmlns:r="http://schemas.openxmlformats.org/officeDocument/2006/relationships" xmlns:p="http://schemas.openxmlformats.org/presentationml/2006/main">
+  <p:cSld>
+    <p:spTree>
+      <p:nvGrpSpPr>
+        <p:cNvPr id="1" name=""/>
+        <p:cNvGrpSpPr/>
+        <p:nvPr/>
+      </p:nvGrpSpPr>
+      <p:grpSpPr>
+        <a:xfrm>
+          <a:off x="0" y="0"/>
+          <a:ext cx="0" cy="0"/>
+          <a:chOff x="0" y="0"/>
+          <a:chExt cx="0" cy="0"/>
+        </a:xfrm>
+      </p:grpSpPr>
+      <p:sp>
+        <p:nvSpPr>
+          <p:cNvPr id="2" name="Title 1"/>
+          <p:cNvSpPr>
+            <a:spLocks noGrp="1"/>
+          </p:cNvSpPr>
+          <p:nvPr>
+            <p:ph type="title"/>
+          </p:nvPr>
+        </p:nvSpPr>
+        <p:spPr/>
+        <p:txBody>
+          <a:bodyPr/>
+          <a:lstStyle/>
+          <a:p>
+            <a:r>
+              <a:rPr lang="en-US" dirty="0" smtClean="0"/>
+              <a:t>For  restarting the </a:t>
+            </a:r>
+            <a:r>
+              <a:rPr lang="en-US" dirty="0" err="1" smtClean="0"/>
+              <a:t>mysql</a:t>
+            </a:r>
+            <a:r>
+              <a:rPr lang="en-US" dirty="0" smtClean="0"/>
+              <a:t> </a:t>
+            </a:r>
+            <a:r>
+              <a:rPr lang="en-US" dirty="0" err="1" smtClean="0"/>
+              <a:t>serever</a:t>
+            </a:r>
+            <a:endParaRPr lang="en-US" dirty="0"/>
+          </a:p>
+        </p:txBody>
+      </p:sp>
+      <p:sp>
+        <p:nvSpPr>
+          <p:cNvPr id="3" name="Content Placeholder 2"/>
+          <p:cNvSpPr>
+            <a:spLocks noGrp="1"/>
+          </p:cNvSpPr>
+          <p:nvPr>
+            <p:ph idx="1"/>
+          </p:nvPr>
+        </p:nvSpPr>
+        <p:spPr>
+          <a:ln>
+            <a:solidFill>
+              <a:schemeClr val="accent1"/>
+            </a:solidFill>
+          </a:ln>
+        </p:spPr>
+        <p:txBody>
+          <a:bodyPr/>
+          <a:lstStyle/>
+          <a:p>
+            <a:r>
+              <a:rPr lang="en-US" dirty="0" smtClean="0"/>
+              <a:t> </a:t>
+            </a:r>
+            <a:r>
+              <a:rPr lang="en-US" dirty="0" err="1" smtClean="0"/>
+              <a:t>sudo</a:t>
+            </a:r>
+            <a:r>
+              <a:rPr lang="en-US" dirty="0" smtClean="0"/>
+              <a:t> /etc/</a:t>
+            </a:r>
+            <a:r>
+              <a:rPr lang="en-US" dirty="0" err="1" smtClean="0"/>
+              <a:t>init.d</a:t>
+            </a:r>
+            <a:r>
+              <a:rPr lang="en-US" dirty="0" smtClean="0"/>
+              <a:t>/</a:t>
+            </a:r>
+            <a:r>
+              <a:rPr lang="en-US" dirty="0" err="1" smtClean="0"/>
+              <a:t>mysql</a:t>
+            </a:r>
+            <a:r>
+              <a:rPr lang="en-US" dirty="0" smtClean="0"/>
+              <a:t> </a:t>
+            </a:r>
+            <a:r>
+              <a:rPr lang="en-US" dirty="0" smtClean="0"/>
+              <a:t>start</a:t>
+            </a:r>
+          </a:p>
+          <a:p>
+            <a:r>
+              <a:rPr lang="en-US" dirty="0" smtClean="0"/>
+              <a:t> </a:t>
+            </a:r>
+            <a:r>
+              <a:rPr lang="en-US" dirty="0" err="1" smtClean="0"/>
+              <a:t>sudo</a:t>
+            </a:r>
+            <a:r>
+              <a:rPr lang="en-US" dirty="0" smtClean="0"/>
+              <a:t> /etc/</a:t>
+            </a:r>
+            <a:r>
+              <a:rPr lang="en-US" dirty="0" err="1" smtClean="0"/>
+              <a:t>init.d</a:t>
+            </a:r>
+            <a:r>
+              <a:rPr lang="en-US" dirty="0" smtClean="0"/>
+              <a:t>/</a:t>
+            </a:r>
+            <a:r>
+              <a:rPr lang="en-US" dirty="0" err="1" smtClean="0"/>
+              <a:t>mysql</a:t>
+            </a:r>
+            <a:r>
+              <a:rPr lang="en-US" dirty="0" smtClean="0"/>
+              <a:t> </a:t>
+            </a:r>
+            <a:r>
+              <a:rPr lang="en-US" dirty="0" smtClean="0"/>
+              <a:t>stop</a:t>
+            </a:r>
+          </a:p>
+          <a:p>
+            <a:r>
+              <a:rPr lang="en-US" dirty="0" smtClean="0"/>
+              <a:t>If it is failing with error : </a:t>
+            </a:r>
+            <a:r>
+              <a:rPr lang="en-US" dirty="0" smtClean="0">
+                <a:solidFill>
+                  <a:srgbClr val="FF0000"/>
+                </a:solidFill>
+              </a:rPr>
+              <a:t>ERROR] Could not open file '/</a:t>
+            </a:r>
+            <a:r>
+              <a:rPr lang="en-US" dirty="0" err="1" smtClean="0">
+                <a:solidFill>
+                  <a:srgbClr val="FF0000"/>
+                </a:solidFill>
+              </a:rPr>
+              <a:t>var</a:t>
+            </a:r>
+            <a:r>
+              <a:rPr lang="en-US" dirty="0" smtClean="0">
+                <a:solidFill>
+                  <a:srgbClr val="FF0000"/>
+                </a:solidFill>
+              </a:rPr>
+              <a:t>/log/</a:t>
+            </a:r>
+            <a:r>
+              <a:rPr lang="en-US" dirty="0" err="1" smtClean="0">
+                <a:solidFill>
+                  <a:srgbClr val="FF0000"/>
+                </a:solidFill>
+              </a:rPr>
+              <a:t>mysql</a:t>
+            </a:r>
+            <a:r>
+              <a:rPr lang="en-US" dirty="0" smtClean="0">
+                <a:solidFill>
+                  <a:srgbClr val="FF0000"/>
+                </a:solidFill>
+              </a:rPr>
+              <a:t>/error.log</a:t>
+            </a:r>
+            <a:r>
+              <a:rPr lang="en-US" dirty="0" smtClean="0">
+                <a:solidFill>
+                  <a:srgbClr val="FF0000"/>
+                </a:solidFill>
+              </a:rPr>
+              <a:t>' for error logging: Permission denied</a:t>
+            </a:r>
+            <a:r>
+              <a:rPr lang="en-US" dirty="0" smtClean="0"/>
+              <a:t> </a:t>
+            </a:r>
+            <a:endParaRPr lang="en-US" dirty="0" smtClean="0"/>
+          </a:p>
+          <a:p>
+            <a:endParaRPr lang="en-US" dirty="0" smtClean="0"/>
+          </a:p>
+          <a:p>
+            <a:r>
+              <a:rPr lang="en-US" smtClean="0">
+                <a:hlinkClick r:id="rId2"/>
+              </a:rPr>
+              <a:t>https</a:t>
+            </a:r>
+            <a:r>
+              <a:rPr lang="en-US" smtClean="0">
+                <a:hlinkClick r:id="rId2"/>
+              </a:rPr>
+              <a:t>://</a:t>
+            </a:r>
+            <a:r>
+              <a:rPr lang="en-US" smtClean="0">
+                <a:hlinkClick r:id="rId2"/>
+              </a:rPr>
+              <a:t>support.plesk.com/hc/en-us/articles/115004039393-Unable-to-start-mysql-var-log-mysql-error-log-Permission-denied</a:t>
+            </a:r>
+            <a:endParaRPr lang="en-US" smtClean="0"/>
+          </a:p>
+          <a:p>
+            <a:endParaRPr lang="en-US" dirty="0"/>
+          </a:p>
+        </p:txBody>
+      </p:sp>
+    </p:spTree>
   </p:cSld>
   <p:clrMapOvr>
     <a:masterClrMapping/>
@@ -4238,7 +4499,7 @@
     </a:clrScheme>
     <a:fontScheme name="Office">
       <a:majorFont>
-        <a:latin typeface="Calibri Light" panose="020F0302020204030204"/>
+        <a:latin typeface="Calibri Light"/>
         <a:ea typeface=""/>
         <a:cs typeface=""/>
         <a:font script="Jpan" typeface="游ゴシック Light"/>
@@ -4290,7 +4551,7 @@
         <a:font script="Tfng" typeface="Ebrima"/>
       </a:majorFont>
       <a:minorFont>
-        <a:latin typeface="Calibri" panose="020F0502020204030204"/>
+        <a:latin typeface="Calibri"/>
         <a:ea typeface=""/>
         <a:cs typeface=""/>
         <a:font script="Jpan" typeface="游ゴシック"/>
@@ -4484,7 +4745,7 @@
   <a:extraClrSchemeLst/>
   <a:extLst>
     <a:ext uri="{05A4C25C-085E-4340-85A3-A5531E510DB2}">
-      <thm15:themeFamily xmlns:thm15="http://schemas.microsoft.com/office/thememl/2012/main" name="Office Theme" id="{62F939B6-93AF-4DB8-9C6B-D6C7DFDC589F}" vid="{4A3C46E8-61CC-4603-A589-7422A47A8E4A}"/>
+      <thm15:themeFamily xmlns:thm15="http://schemas.microsoft.com/office/thememl/2012/main" xmlns="" name="Office Theme" id="{62F939B6-93AF-4DB8-9C6B-D6C7DFDC589F}" vid="{4A3C46E8-61CC-4603-A589-7422A47A8E4A}"/>
     </a:ext>
   </a:extLst>
 </a:theme>

</xml_diff>